<commit_message>
test push and merge webhook
</commit_message>
<xml_diff>
--- a/pdfs/ClassNotesAndDescriptions.pptx
+++ b/pdfs/ClassNotesAndDescriptions.pptx
@@ -6,6 +6,7 @@
   </p:sldMasterIdLst>
   <p:sldIdLst>
     <p:sldId id="258" r:id="rId2"/>
+    <p:sldId id="259" r:id="rId3"/>
   </p:sldIdLst>
   <p:sldSz cx="12192000" cy="6858000"/>
   <p:notesSz cx="6858000" cy="9144000"/>
@@ -3369,6 +3370,116 @@
 </p:sld>
 </file>
 
+<file path=ppt/slides/slide2.xml><?xml version="1.0" encoding="utf-8"?>
+<p:sld xmlns:a="http://schemas.openxmlformats.org/drawingml/2006/main" xmlns:r="http://schemas.openxmlformats.org/officeDocument/2006/relationships" xmlns:p="http://schemas.openxmlformats.org/presentationml/2006/main">
+  <p:cSld>
+    <p:spTree>
+      <p:nvGrpSpPr>
+        <p:cNvPr id="1" name=""/>
+        <p:cNvGrpSpPr/>
+        <p:nvPr/>
+      </p:nvGrpSpPr>
+      <p:grpSpPr>
+        <a:xfrm>
+          <a:off x="0" y="0"/>
+          <a:ext cx="0" cy="0"/>
+          <a:chOff x="0" y="0"/>
+          <a:chExt cx="0" cy="0"/>
+        </a:xfrm>
+      </p:grpSpPr>
+      <p:sp>
+        <p:nvSpPr>
+          <p:cNvPr id="2" name="Title 1">
+            <a:extLst>
+              <a:ext uri="{FF2B5EF4-FFF2-40B4-BE49-F238E27FC236}">
+                <a16:creationId xmlns:a16="http://schemas.microsoft.com/office/drawing/2014/main" id="{2F372157-5D4F-459A-9701-B0BE28CE4622}"/>
+              </a:ext>
+            </a:extLst>
+          </p:cNvPr>
+          <p:cNvSpPr>
+            <a:spLocks noGrp="1"/>
+          </p:cNvSpPr>
+          <p:nvPr>
+            <p:ph type="title"/>
+          </p:nvPr>
+        </p:nvSpPr>
+        <p:spPr/>
+        <p:txBody>
+          <a:bodyPr/>
+          <a:lstStyle/>
+          <a:p>
+            <a:endParaRPr lang="en-US"/>
+          </a:p>
+        </p:txBody>
+      </p:sp>
+      <p:sp>
+        <p:nvSpPr>
+          <p:cNvPr id="3" name="Content Placeholder 2">
+            <a:extLst>
+              <a:ext uri="{FF2B5EF4-FFF2-40B4-BE49-F238E27FC236}">
+                <a16:creationId xmlns:a16="http://schemas.microsoft.com/office/drawing/2014/main" id="{3AFAE452-D0FA-4BB1-80A2-B90665C3A495}"/>
+              </a:ext>
+            </a:extLst>
+          </p:cNvPr>
+          <p:cNvSpPr>
+            <a:spLocks noGrp="1"/>
+          </p:cNvSpPr>
+          <p:nvPr>
+            <p:ph idx="1"/>
+          </p:nvPr>
+        </p:nvSpPr>
+        <p:spPr/>
+        <p:txBody>
+          <a:bodyPr/>
+          <a:lstStyle/>
+          <a:p>
+            <a:endParaRPr lang="en-US"/>
+          </a:p>
+        </p:txBody>
+      </p:sp>
+      <p:pic>
+        <p:nvPicPr>
+          <p:cNvPr id="5" name="Picture 4" descr="Diagram&#10;&#10;Description automatically generated">
+            <a:extLst>
+              <a:ext uri="{FF2B5EF4-FFF2-40B4-BE49-F238E27FC236}">
+                <a16:creationId xmlns:a16="http://schemas.microsoft.com/office/drawing/2014/main" id="{C067527D-02EE-4B78-BD5A-07C4F6A88AB5}"/>
+              </a:ext>
+            </a:extLst>
+          </p:cNvPr>
+          <p:cNvPicPr>
+            <a:picLocks noChangeAspect="1"/>
+          </p:cNvPicPr>
+          <p:nvPr/>
+        </p:nvPicPr>
+        <p:blipFill>
+          <a:blip r:embed="rId2"/>
+          <a:stretch>
+            <a:fillRect/>
+          </a:stretch>
+        </p:blipFill>
+        <p:spPr>
+          <a:xfrm>
+            <a:off x="1426406" y="0"/>
+            <a:ext cx="9339187" cy="6858000"/>
+          </a:xfrm>
+          <a:prstGeom prst="rect">
+            <a:avLst/>
+          </a:prstGeom>
+        </p:spPr>
+      </p:pic>
+    </p:spTree>
+    <p:extLst>
+      <p:ext uri="{BB962C8B-B14F-4D97-AF65-F5344CB8AC3E}">
+        <p14:creationId xmlns:p14="http://schemas.microsoft.com/office/powerpoint/2010/main" val="1920433544"/>
+      </p:ext>
+    </p:extLst>
+  </p:cSld>
+  <p:clrMapOvr>
+    <a:masterClrMapping/>
+  </p:clrMapOvr>
+</p:sld>
+</file>
+
 <file path=ppt/theme/theme1.xml><?xml version="1.0" encoding="utf-8"?>
 <a:theme xmlns:a="http://schemas.openxmlformats.org/drawingml/2006/main" name="Office Theme">
   <a:themeElements>

</xml_diff>

<commit_message>
adds JS functions and classes demos
</commit_message>
<xml_diff>
--- a/pdfs/ClassNotesAndDescriptions.pptx
+++ b/pdfs/ClassNotesAndDescriptions.pptx
@@ -7,6 +7,7 @@
   <p:sldIdLst>
     <p:sldId id="258" r:id="rId2"/>
     <p:sldId id="259" r:id="rId3"/>
+    <p:sldId id="260" r:id="rId4"/>
   </p:sldIdLst>
   <p:sldSz cx="12192000" cy="6858000"/>
   <p:notesSz cx="6858000" cy="9144000"/>
@@ -113,6 +114,303 @@
 </p:presentation>
 </file>
 
+<file path=ppt/ink/ink1.xml><?xml version="1.0" encoding="utf-8"?>
+<inkml:ink xmlns:inkml="http://www.w3.org/2003/InkML">
+  <inkml:definitions>
+    <inkml:context xml:id="ctx0">
+      <inkml:inkSource xml:id="inkSrc0">
+        <inkml:traceFormat>
+          <inkml:channel name="X" type="integer" min="-2.14748E9" max="2.14748E9" units="cm"/>
+          <inkml:channel name="Y" type="integer" min="-2.14748E9" max="2.14748E9" units="cm"/>
+        </inkml:traceFormat>
+        <inkml:channelProperties>
+          <inkml:channelProperty channel="X" name="resolution" value="1000" units="1/cm"/>
+          <inkml:channelProperty channel="Y" name="resolution" value="1000" units="1/cm"/>
+        </inkml:channelProperties>
+      </inkml:inkSource>
+      <inkml:timestamp xml:id="ts0" timeString="2021-09-07T18:55:46.974"/>
+    </inkml:context>
+    <inkml:brush xml:id="br0">
+      <inkml:brushProperty name="width" value="0.05" units="cm"/>
+      <inkml:brushProperty name="height" value="0.05" units="cm"/>
+      <inkml:brushProperty name="color" value="#E71224"/>
+      <inkml:brushProperty name="ignorePressure" value="1"/>
+    </inkml:brush>
+  </inkml:definitions>
+  <inkml:trace contextRef="#ctx0" brushRef="#br0">0 28,'5'-5,"5"-1,4 1,4 0,3 2,5 1,7 1,2 0,0 1,-4 0,-2 1,-7-1</inkml:trace>
+</inkml:ink>
+</file>
+
+<file path=ppt/ink/ink10.xml><?xml version="1.0" encoding="utf-8"?>
+<inkml:ink xmlns:inkml="http://www.w3.org/2003/InkML">
+  <inkml:definitions>
+    <inkml:context xml:id="ctx0">
+      <inkml:inkSource xml:id="inkSrc0">
+        <inkml:traceFormat>
+          <inkml:channel name="X" type="integer" min="-2.14748E9" max="2.14748E9" units="cm"/>
+          <inkml:channel name="Y" type="integer" min="-2.14748E9" max="2.14748E9" units="cm"/>
+        </inkml:traceFormat>
+        <inkml:channelProperties>
+          <inkml:channelProperty channel="X" name="resolution" value="1000" units="1/cm"/>
+          <inkml:channelProperty channel="Y" name="resolution" value="1000" units="1/cm"/>
+        </inkml:channelProperties>
+      </inkml:inkSource>
+      <inkml:timestamp xml:id="ts0" timeString="2021-09-07T18:56:19.688"/>
+    </inkml:context>
+    <inkml:brush xml:id="br0">
+      <inkml:brushProperty name="width" value="0.05" units="cm"/>
+      <inkml:brushProperty name="height" value="0.05" units="cm"/>
+      <inkml:brushProperty name="color" value="#E71224"/>
+      <inkml:brushProperty name="ignorePressure" value="1"/>
+    </inkml:brush>
+  </inkml:definitions>
+  <inkml:trace contextRef="#ctx0" brushRef="#br0">1 1,'878'0,"-641"13,-61-1,-4-10,1 0,-78 10,-11-2,159-15,-142-1,34 5,-92 2,-37-1,1 0,-1-1,1 1,10-4,-2-1</inkml:trace>
+</inkml:ink>
+</file>
+
+<file path=ppt/ink/ink11.xml><?xml version="1.0" encoding="utf-8"?>
+<inkml:ink xmlns:inkml="http://www.w3.org/2003/InkML">
+  <inkml:definitions>
+    <inkml:context xml:id="ctx0">
+      <inkml:inkSource xml:id="inkSrc0">
+        <inkml:traceFormat>
+          <inkml:channel name="X" type="integer" min="-2.14748E9" max="2.14748E9" units="cm"/>
+          <inkml:channel name="Y" type="integer" min="-2.14748E9" max="2.14748E9" units="cm"/>
+        </inkml:traceFormat>
+        <inkml:channelProperties>
+          <inkml:channelProperty channel="X" name="resolution" value="1000" units="1/cm"/>
+          <inkml:channelProperty channel="Y" name="resolution" value="1000" units="1/cm"/>
+        </inkml:channelProperties>
+      </inkml:inkSource>
+      <inkml:timestamp xml:id="ts0" timeString="2021-09-07T18:56:35.921"/>
+    </inkml:context>
+    <inkml:brush xml:id="br0">
+      <inkml:brushProperty name="width" value="0.05" units="cm"/>
+      <inkml:brushProperty name="height" value="0.05" units="cm"/>
+      <inkml:brushProperty name="color" value="#E71224"/>
+      <inkml:brushProperty name="ignorePressure" value="1"/>
+    </inkml:brush>
+  </inkml:definitions>
+  <inkml:trace contextRef="#ctx0" brushRef="#br0">0 0,'0'0</inkml:trace>
+</inkml:ink>
+</file>
+
+<file path=ppt/ink/ink2.xml><?xml version="1.0" encoding="utf-8"?>
+<inkml:ink xmlns:inkml="http://www.w3.org/2003/InkML">
+  <inkml:definitions>
+    <inkml:context xml:id="ctx0">
+      <inkml:inkSource xml:id="inkSrc0">
+        <inkml:traceFormat>
+          <inkml:channel name="X" type="integer" min="-2.14748E9" max="2.14748E9" units="cm"/>
+          <inkml:channel name="Y" type="integer" min="-2.14748E9" max="2.14748E9" units="cm"/>
+        </inkml:traceFormat>
+        <inkml:channelProperties>
+          <inkml:channelProperty channel="X" name="resolution" value="1000" units="1/cm"/>
+          <inkml:channelProperty channel="Y" name="resolution" value="1000" units="1/cm"/>
+        </inkml:channelProperties>
+      </inkml:inkSource>
+      <inkml:timestamp xml:id="ts0" timeString="2021-09-07T18:56:02.628"/>
+    </inkml:context>
+    <inkml:brush xml:id="br0">
+      <inkml:brushProperty name="width" value="0.05" units="cm"/>
+      <inkml:brushProperty name="height" value="0.05" units="cm"/>
+      <inkml:brushProperty name="color" value="#E71224"/>
+      <inkml:brushProperty name="ignorePressure" value="1"/>
+    </inkml:brush>
+  </inkml:definitions>
+  <inkml:trace contextRef="#ctx0" brushRef="#br0">0 1,'35'3,"-9"0,878 31,-417-18,-326-5,95 14,-228-21,26 6,0-3,63 0,1216-10,-745 4,-437 0,423-6,112 2,321 11,-693-9,1876 1,-2171 0</inkml:trace>
+</inkml:ink>
+</file>
+
+<file path=ppt/ink/ink3.xml><?xml version="1.0" encoding="utf-8"?>
+<inkml:ink xmlns:inkml="http://www.w3.org/2003/InkML">
+  <inkml:definitions>
+    <inkml:context xml:id="ctx0">
+      <inkml:inkSource xml:id="inkSrc0">
+        <inkml:traceFormat>
+          <inkml:channel name="X" type="integer" min="-2.14748E9" max="2.14748E9" units="cm"/>
+          <inkml:channel name="Y" type="integer" min="-2.14748E9" max="2.14748E9" units="cm"/>
+        </inkml:traceFormat>
+        <inkml:channelProperties>
+          <inkml:channelProperty channel="X" name="resolution" value="1000" units="1/cm"/>
+          <inkml:channelProperty channel="Y" name="resolution" value="1000" units="1/cm"/>
+        </inkml:channelProperties>
+      </inkml:inkSource>
+      <inkml:timestamp xml:id="ts0" timeString="2021-09-07T18:56:04.563"/>
+    </inkml:context>
+    <inkml:brush xml:id="br0">
+      <inkml:brushProperty name="width" value="0.05" units="cm"/>
+      <inkml:brushProperty name="height" value="0.05" units="cm"/>
+      <inkml:brushProperty name="color" value="#E71224"/>
+      <inkml:brushProperty name="ignorePressure" value="1"/>
+    </inkml:brush>
+  </inkml:definitions>
+  <inkml:trace contextRef="#ctx0" brushRef="#br0">0 1,'76'0,"83"1,-37 10,-112-10,60 11,-35-5,37 1,136-8,-190-2,-4-1</inkml:trace>
+</inkml:ink>
+</file>
+
+<file path=ppt/ink/ink4.xml><?xml version="1.0" encoding="utf-8"?>
+<inkml:ink xmlns:inkml="http://www.w3.org/2003/InkML">
+  <inkml:definitions>
+    <inkml:context xml:id="ctx0">
+      <inkml:inkSource xml:id="inkSrc0">
+        <inkml:traceFormat>
+          <inkml:channel name="X" type="integer" min="-2.14748E9" max="2.14748E9" units="cm"/>
+          <inkml:channel name="Y" type="integer" min="-2.14748E9" max="2.14748E9" units="cm"/>
+        </inkml:traceFormat>
+        <inkml:channelProperties>
+          <inkml:channelProperty channel="X" name="resolution" value="1000" units="1/cm"/>
+          <inkml:channelProperty channel="Y" name="resolution" value="1000" units="1/cm"/>
+        </inkml:channelProperties>
+      </inkml:inkSource>
+      <inkml:timestamp xml:id="ts0" timeString="2021-09-07T18:55:50.713"/>
+    </inkml:context>
+    <inkml:brush xml:id="br0">
+      <inkml:brushProperty name="width" value="0.05" units="cm"/>
+      <inkml:brushProperty name="height" value="0.05" units="cm"/>
+      <inkml:brushProperty name="color" value="#E71224"/>
+      <inkml:brushProperty name="ignorePressure" value="1"/>
+    </inkml:brush>
+  </inkml:definitions>
+  <inkml:trace contextRef="#ctx0" brushRef="#br0">1 1,'455'14,"-314"-8,558 1,-444-8,3916 1,-4040 7,-103-4,-1 2,46 15,-47-13,0-1,44 4,-5-1,213 44,-129-24,42 21,-43-8,481 146,-628-188,7 2,-1 1,-1-1,1 2,7 3,-12-5,0-1,0 0,-1 1,1-1,-1 1,1 0,-1 0,0-1,1 1,-1 0,0 0,0 0,0 0,0 0,-1 1,1-1,0 4,0 3,-1 0,0 1,0-1,-1 0,0 1,-1-1,-4 14,-24 61,-21 31,18-43,19-37,11-27,0 1,-1 0,0-1,0 1,-1-1,0 0,0-1,-1 1,-8 7,6-6,0-1,0 1,1 1,-11 17,-19 45,1 0,24-51,6-10,0 0,-1-1,-12 15,-29 36,15-17,20-28,0 1,-18 34,26-42,1 0,0 1,1-1,0 1,0 0,1 0,1 0,-1 10,3 91,0-43,-1-60,0 0,1 0,0 0,0 0,1 0,-1 0,2 0,-1-1,1 1,0-1,1 0,0 0,5 8,17 21,2-2,1 0,1-2,40 32,-70-64,12 9,20 14,-28-21,1 0,0 1,0-1,-1-1,2 1,-1-1,0 0,6 1,28 0,50-4,-19 0,15 2,-74 0</inkml:trace>
+</inkml:ink>
+</file>
+
+<file path=ppt/ink/ink5.xml><?xml version="1.0" encoding="utf-8"?>
+<inkml:ink xmlns:inkml="http://www.w3.org/2003/InkML">
+  <inkml:definitions>
+    <inkml:context xml:id="ctx0">
+      <inkml:inkSource xml:id="inkSrc0">
+        <inkml:traceFormat>
+          <inkml:channel name="X" type="integer" min="-2.14748E9" max="2.14748E9" units="cm"/>
+          <inkml:channel name="Y" type="integer" min="-2.14748E9" max="2.14748E9" units="cm"/>
+        </inkml:traceFormat>
+        <inkml:channelProperties>
+          <inkml:channelProperty channel="X" name="resolution" value="1000" units="1/cm"/>
+          <inkml:channelProperty channel="Y" name="resolution" value="1000" units="1/cm"/>
+        </inkml:channelProperties>
+      </inkml:inkSource>
+      <inkml:timestamp xml:id="ts0" timeString="2021-09-07T18:55:53.008"/>
+    </inkml:context>
+    <inkml:brush xml:id="br0">
+      <inkml:brushProperty name="width" value="0.05" units="cm"/>
+      <inkml:brushProperty name="height" value="0.05" units="cm"/>
+      <inkml:brushProperty name="color" value="#E71224"/>
+      <inkml:brushProperty name="ignorePressure" value="1"/>
+    </inkml:brush>
+  </inkml:definitions>
+  <inkml:trace contextRef="#ctx0" brushRef="#br0">34 1,'3'0,"1"1,-1-1,0 1,0 0,0 0,0 0,0 0,0 1,0-1,0 1,0 0,-1 0,1 0,-1 0,1 0,1 3,5 4,-1 1,11 18,-11-14,-2-1,0 1,8 27,-10-30,-1 1,1-1,1 0,0 0,1-1,0 1,9 11,-5-10,1-1,1 0,0 0,0-1,17 10,-29-20,0 0,0 0,0 0,0 0,0 0,0 0,0 0,0 0,0 0,0 0,0 0,0 0,0 0,0 0,1 0,-1 0,0 0,0 0,0 0,0 0,0 1,0-1,0 0,0 0,0 0,0 0,0 0,0 0,0 0,0 0,0 0,0 0,0 0,0 0,0 0,0 0,0 1,0-1,0 0,0 0,0 0,0 0,0 0,0 0,0 0,-1 0,1 0,0 0,0 0,0 0,0 0,0 0,0 0,0 0,0 0,0 0,0 0,0 1,0-1,0 0,0 0,0 0,0 0,-1 0,-7 2,-17 2,18-3,-2 0,0 2,0-1,0 1,0 1,0 0,0 0,1 0,0 1,-11 9,-4 5,-35 36,43-40,4-3,-20 17,19-20</inkml:trace>
+</inkml:ink>
+</file>
+
+<file path=ppt/ink/ink6.xml><?xml version="1.0" encoding="utf-8"?>
+<inkml:ink xmlns:inkml="http://www.w3.org/2003/InkML">
+  <inkml:definitions>
+    <inkml:context xml:id="ctx0">
+      <inkml:inkSource xml:id="inkSrc0">
+        <inkml:traceFormat>
+          <inkml:channel name="X" type="integer" min="-2.14748E9" max="2.14748E9" units="cm"/>
+          <inkml:channel name="Y" type="integer" min="-2.14748E9" max="2.14748E9" units="cm"/>
+        </inkml:traceFormat>
+        <inkml:channelProperties>
+          <inkml:channelProperty channel="X" name="resolution" value="1000" units="1/cm"/>
+          <inkml:channelProperty channel="Y" name="resolution" value="1000" units="1/cm"/>
+        </inkml:channelProperties>
+      </inkml:inkSource>
+      <inkml:timestamp xml:id="ts0" timeString="2021-09-07T18:56:13.672"/>
+    </inkml:context>
+    <inkml:brush xml:id="br0">
+      <inkml:brushProperty name="width" value="0.05" units="cm"/>
+      <inkml:brushProperty name="height" value="0.05" units="cm"/>
+      <inkml:brushProperty name="color" value="#E71224"/>
+      <inkml:brushProperty name="ignorePressure" value="1"/>
+    </inkml:brush>
+  </inkml:definitions>
+  <inkml:trace contextRef="#ctx0" brushRef="#br0">0 162,'0'-1,"0"0,0 1,0-1,0 0,0 1,1-1,-1 0,0 0,0 1,1-1,-1 0,0 1,1-1,-1 1,1-1,-1 0,0 1,1-1,-1 1,1-1,0 1,-1-1,1 1,0-1,1 0,1 0,-1 1,0-1,0 1,0-1,1 1,2-1,19 1,1 1,25 3,-6 0,32 1,114-8,-95-10,-42 5,189-31,-11 2,-136 23,266-27,-166 42,-65 1,2258-2,-2192 6,-26 0,-45-6,133 6,231 15,66-21,-312 0,-96 12,-54-3,52 3,275 9,119-22,-297 2,-217-3,47-7,-9-1,260 3,-204 8,-100-1</inkml:trace>
+</inkml:ink>
+</file>
+
+<file path=ppt/ink/ink7.xml><?xml version="1.0" encoding="utf-8"?>
+<inkml:ink xmlns:inkml="http://www.w3.org/2003/InkML">
+  <inkml:definitions>
+    <inkml:context xml:id="ctx0">
+      <inkml:inkSource xml:id="inkSrc0">
+        <inkml:traceFormat>
+          <inkml:channel name="X" type="integer" min="-2.14748E9" max="2.14748E9" units="cm"/>
+          <inkml:channel name="Y" type="integer" min="-2.14748E9" max="2.14748E9" units="cm"/>
+        </inkml:traceFormat>
+        <inkml:channelProperties>
+          <inkml:channelProperty channel="X" name="resolution" value="1000" units="1/cm"/>
+          <inkml:channelProperty channel="Y" name="resolution" value="1000" units="1/cm"/>
+        </inkml:channelProperties>
+      </inkml:inkSource>
+      <inkml:timestamp xml:id="ts0" timeString="2021-09-07T18:56:15.277"/>
+    </inkml:context>
+    <inkml:brush xml:id="br0">
+      <inkml:brushProperty name="width" value="0.05" units="cm"/>
+      <inkml:brushProperty name="height" value="0.05" units="cm"/>
+      <inkml:brushProperty name="color" value="#E71224"/>
+      <inkml:brushProperty name="ignorePressure" value="1"/>
+    </inkml:brush>
+  </inkml:definitions>
+  <inkml:trace contextRef="#ctx0" brushRef="#br0">0 1,'0'1,"0"0,1 0,-1 0,0 0,1 0,-1 0,1 0,-1 0,1 0,-1 0,1 0,-1-1,1 1,0 0,0 0,-1 0,1-1,0 1,0 0,1 0,22 11,-20-10,21 8,1-1,0-1,0-1,36 4,110 3,253-12,-235-4,464 2,-643 0</inkml:trace>
+</inkml:ink>
+</file>
+
+<file path=ppt/ink/ink8.xml><?xml version="1.0" encoding="utf-8"?>
+<inkml:ink xmlns:inkml="http://www.w3.org/2003/InkML">
+  <inkml:definitions>
+    <inkml:context xml:id="ctx0">
+      <inkml:inkSource xml:id="inkSrc0">
+        <inkml:traceFormat>
+          <inkml:channel name="X" type="integer" min="-2.14748E9" max="2.14748E9" units="cm"/>
+          <inkml:channel name="Y" type="integer" min="-2.14748E9" max="2.14748E9" units="cm"/>
+        </inkml:traceFormat>
+        <inkml:channelProperties>
+          <inkml:channelProperty channel="X" name="resolution" value="1000" units="1/cm"/>
+          <inkml:channelProperty channel="Y" name="resolution" value="1000" units="1/cm"/>
+        </inkml:channelProperties>
+      </inkml:inkSource>
+      <inkml:timestamp xml:id="ts0" timeString="2021-09-07T18:56:16.092"/>
+    </inkml:context>
+    <inkml:brush xml:id="br0">
+      <inkml:brushProperty name="width" value="0.05" units="cm"/>
+      <inkml:brushProperty name="height" value="0.05" units="cm"/>
+      <inkml:brushProperty name="color" value="#E71224"/>
+      <inkml:brushProperty name="ignorePressure" value="1"/>
+    </inkml:brush>
+  </inkml:definitions>
+  <inkml:trace contextRef="#ctx0" brushRef="#br0">1 54,'758'0,"-348"-27,-26 0,-338 27,-9 0</inkml:trace>
+</inkml:ink>
+</file>
+
+<file path=ppt/ink/ink9.xml><?xml version="1.0" encoding="utf-8"?>
+<inkml:ink xmlns:inkml="http://www.w3.org/2003/InkML">
+  <inkml:definitions>
+    <inkml:context xml:id="ctx0">
+      <inkml:inkSource xml:id="inkSrc0">
+        <inkml:traceFormat>
+          <inkml:channel name="X" type="integer" min="-2.14748E9" max="2.14748E9" units="cm"/>
+          <inkml:channel name="Y" type="integer" min="-2.14748E9" max="2.14748E9" units="cm"/>
+        </inkml:traceFormat>
+        <inkml:channelProperties>
+          <inkml:channelProperty channel="X" name="resolution" value="1000" units="1/cm"/>
+          <inkml:channelProperty channel="Y" name="resolution" value="1000" units="1/cm"/>
+        </inkml:channelProperties>
+      </inkml:inkSource>
+      <inkml:timestamp xml:id="ts0" timeString="2021-09-07T18:56:16.922"/>
+    </inkml:context>
+    <inkml:brush xml:id="br0">
+      <inkml:brushProperty name="width" value="0.05" units="cm"/>
+      <inkml:brushProperty name="height" value="0.05" units="cm"/>
+      <inkml:brushProperty name="color" value="#E71224"/>
+      <inkml:brushProperty name="ignorePressure" value="1"/>
+    </inkml:brush>
+  </inkml:definitions>
+  <inkml:trace contextRef="#ctx0" brushRef="#br0">0 2,'244'-1,"268"2,-115 37,-314-27,84 7,81 13,-226-27,-21-2,-4-1,-7 1,-38-2,23 0</inkml:trace>
+</inkml:ink>
+</file>
+
 <file path=ppt/slideLayouts/slideLayout1.xml><?xml version="1.0" encoding="utf-8"?>
 <p:sldLayout xmlns:a="http://schemas.openxmlformats.org/drawingml/2006/main" xmlns:r="http://schemas.openxmlformats.org/officeDocument/2006/relationships" xmlns:p="http://schemas.openxmlformats.org/presentationml/2006/main" type="title" preserve="1">
   <p:cSld name="Title Slide">
@@ -260,7 +558,7 @@
           <a:p>
             <a:fld id="{EE0E9B7B-8DCB-44BB-8FF6-D985050C0BF0}" type="datetimeFigureOut">
               <a:rPr lang="en-US" smtClean="0"/>
-              <a:t>8/16/2021</a:t>
+              <a:t>9/7/2021</a:t>
             </a:fld>
             <a:endParaRPr lang="en-US"/>
           </a:p>
@@ -458,7 +756,7 @@
           <a:p>
             <a:fld id="{EE0E9B7B-8DCB-44BB-8FF6-D985050C0BF0}" type="datetimeFigureOut">
               <a:rPr lang="en-US" smtClean="0"/>
-              <a:t>8/16/2021</a:t>
+              <a:t>9/7/2021</a:t>
             </a:fld>
             <a:endParaRPr lang="en-US"/>
           </a:p>
@@ -666,7 +964,7 @@
           <a:p>
             <a:fld id="{EE0E9B7B-8DCB-44BB-8FF6-D985050C0BF0}" type="datetimeFigureOut">
               <a:rPr lang="en-US" smtClean="0"/>
-              <a:t>8/16/2021</a:t>
+              <a:t>9/7/2021</a:t>
             </a:fld>
             <a:endParaRPr lang="en-US"/>
           </a:p>
@@ -864,7 +1162,7 @@
           <a:p>
             <a:fld id="{EE0E9B7B-8DCB-44BB-8FF6-D985050C0BF0}" type="datetimeFigureOut">
               <a:rPr lang="en-US" smtClean="0"/>
-              <a:t>8/16/2021</a:t>
+              <a:t>9/7/2021</a:t>
             </a:fld>
             <a:endParaRPr lang="en-US"/>
           </a:p>
@@ -1139,7 +1437,7 @@
           <a:p>
             <a:fld id="{EE0E9B7B-8DCB-44BB-8FF6-D985050C0BF0}" type="datetimeFigureOut">
               <a:rPr lang="en-US" smtClean="0"/>
-              <a:t>8/16/2021</a:t>
+              <a:t>9/7/2021</a:t>
             </a:fld>
             <a:endParaRPr lang="en-US"/>
           </a:p>
@@ -1404,7 +1702,7 @@
           <a:p>
             <a:fld id="{EE0E9B7B-8DCB-44BB-8FF6-D985050C0BF0}" type="datetimeFigureOut">
               <a:rPr lang="en-US" smtClean="0"/>
-              <a:t>8/16/2021</a:t>
+              <a:t>9/7/2021</a:t>
             </a:fld>
             <a:endParaRPr lang="en-US"/>
           </a:p>
@@ -1816,7 +2114,7 @@
           <a:p>
             <a:fld id="{EE0E9B7B-8DCB-44BB-8FF6-D985050C0BF0}" type="datetimeFigureOut">
               <a:rPr lang="en-US" smtClean="0"/>
-              <a:t>8/16/2021</a:t>
+              <a:t>9/7/2021</a:t>
             </a:fld>
             <a:endParaRPr lang="en-US"/>
           </a:p>
@@ -1957,7 +2255,7 @@
           <a:p>
             <a:fld id="{EE0E9B7B-8DCB-44BB-8FF6-D985050C0BF0}" type="datetimeFigureOut">
               <a:rPr lang="en-US" smtClean="0"/>
-              <a:t>8/16/2021</a:t>
+              <a:t>9/7/2021</a:t>
             </a:fld>
             <a:endParaRPr lang="en-US"/>
           </a:p>
@@ -2070,7 +2368,7 @@
           <a:p>
             <a:fld id="{EE0E9B7B-8DCB-44BB-8FF6-D985050C0BF0}" type="datetimeFigureOut">
               <a:rPr lang="en-US" smtClean="0"/>
-              <a:t>8/16/2021</a:t>
+              <a:t>9/7/2021</a:t>
             </a:fld>
             <a:endParaRPr lang="en-US"/>
           </a:p>
@@ -2381,7 +2679,7 @@
           <a:p>
             <a:fld id="{EE0E9B7B-8DCB-44BB-8FF6-D985050C0BF0}" type="datetimeFigureOut">
               <a:rPr lang="en-US" smtClean="0"/>
-              <a:t>8/16/2021</a:t>
+              <a:t>9/7/2021</a:t>
             </a:fld>
             <a:endParaRPr lang="en-US"/>
           </a:p>
@@ -2669,7 +2967,7 @@
           <a:p>
             <a:fld id="{EE0E9B7B-8DCB-44BB-8FF6-D985050C0BF0}" type="datetimeFigureOut">
               <a:rPr lang="en-US" smtClean="0"/>
-              <a:t>8/16/2021</a:t>
+              <a:t>9/7/2021</a:t>
             </a:fld>
             <a:endParaRPr lang="en-US"/>
           </a:p>
@@ -2910,7 +3208,7 @@
           <a:p>
             <a:fld id="{EE0E9B7B-8DCB-44BB-8FF6-D985050C0BF0}" type="datetimeFigureOut">
               <a:rPr lang="en-US" smtClean="0"/>
-              <a:t>8/16/2021</a:t>
+              <a:t>9/7/2021</a:t>
             </a:fld>
             <a:endParaRPr lang="en-US"/>
           </a:p>
@@ -3480,6 +3778,1017 @@
 </p:sld>
 </file>
 
+<file path=ppt/slides/slide3.xml><?xml version="1.0" encoding="utf-8"?>
+<p:sld xmlns:a="http://schemas.openxmlformats.org/drawingml/2006/main" xmlns:r="http://schemas.openxmlformats.org/officeDocument/2006/relationships" xmlns:p="http://schemas.openxmlformats.org/presentationml/2006/main">
+  <p:cSld>
+    <p:spTree>
+      <p:nvGrpSpPr>
+        <p:cNvPr id="1" name=""/>
+        <p:cNvGrpSpPr/>
+        <p:nvPr/>
+      </p:nvGrpSpPr>
+      <p:grpSpPr>
+        <a:xfrm>
+          <a:off x="0" y="0"/>
+          <a:ext cx="0" cy="0"/>
+          <a:chOff x="0" y="0"/>
+          <a:chExt cx="0" cy="0"/>
+        </a:xfrm>
+      </p:grpSpPr>
+      <p:sp>
+        <p:nvSpPr>
+          <p:cNvPr id="2" name="Title 1">
+            <a:extLst>
+              <a:ext uri="{FF2B5EF4-FFF2-40B4-BE49-F238E27FC236}">
+                <a16:creationId xmlns:a16="http://schemas.microsoft.com/office/drawing/2014/main" id="{3B4BA0D7-A4E7-4558-A0E8-8FAF5BF49373}"/>
+              </a:ext>
+            </a:extLst>
+          </p:cNvPr>
+          <p:cNvSpPr>
+            <a:spLocks noGrp="1"/>
+          </p:cNvSpPr>
+          <p:nvPr>
+            <p:ph type="title"/>
+          </p:nvPr>
+        </p:nvSpPr>
+        <p:spPr/>
+        <p:txBody>
+          <a:bodyPr/>
+          <a:lstStyle/>
+          <a:p>
+            <a:r>
+              <a:rPr lang="en-US" dirty="0"/>
+              <a:t>Stack vs Heap</a:t>
+            </a:r>
+          </a:p>
+        </p:txBody>
+      </p:sp>
+      <p:graphicFrame>
+        <p:nvGraphicFramePr>
+          <p:cNvPr id="4" name="Table 4">
+            <a:extLst>
+              <a:ext uri="{FF2B5EF4-FFF2-40B4-BE49-F238E27FC236}">
+                <a16:creationId xmlns:a16="http://schemas.microsoft.com/office/drawing/2014/main" id="{1BC8D2FF-2FEF-447D-A3CE-2F20150DC186}"/>
+              </a:ext>
+            </a:extLst>
+          </p:cNvPr>
+          <p:cNvGraphicFramePr>
+            <a:graphicFrameLocks noGrp="1"/>
+          </p:cNvGraphicFramePr>
+          <p:nvPr>
+            <p:ph idx="1"/>
+            <p:extLst>
+              <p:ext uri="{D42A27DB-BD31-4B8C-83A1-F6EECF244321}">
+                <p14:modId xmlns:p14="http://schemas.microsoft.com/office/powerpoint/2010/main" val="2970928569"/>
+              </p:ext>
+            </p:extLst>
+          </p:nvPr>
+        </p:nvGraphicFramePr>
+        <p:xfrm>
+          <a:off x="838200" y="1825625"/>
+          <a:ext cx="10515600" cy="3708400"/>
+        </p:xfrm>
+        <a:graphic>
+          <a:graphicData uri="http://schemas.openxmlformats.org/drawingml/2006/table">
+            <a:tbl>
+              <a:tblPr firstRow="1" bandRow="1">
+                <a:tableStyleId>{5C22544A-7EE6-4342-B048-85BDC9FD1C3A}</a:tableStyleId>
+              </a:tblPr>
+              <a:tblGrid>
+                <a:gridCol w="5257800">
+                  <a:extLst>
+                    <a:ext uri="{9D8B030D-6E8A-4147-A177-3AD203B41FA5}">
+                      <a16:colId xmlns:a16="http://schemas.microsoft.com/office/drawing/2014/main" val="3048183076"/>
+                    </a:ext>
+                  </a:extLst>
+                </a:gridCol>
+                <a:gridCol w="5257800">
+                  <a:extLst>
+                    <a:ext uri="{9D8B030D-6E8A-4147-A177-3AD203B41FA5}">
+                      <a16:colId xmlns:a16="http://schemas.microsoft.com/office/drawing/2014/main" val="1737558530"/>
+                    </a:ext>
+                  </a:extLst>
+                </a:gridCol>
+              </a:tblGrid>
+              <a:tr h="370840">
+                <a:tc>
+                  <a:txBody>
+                    <a:bodyPr/>
+                    <a:lstStyle/>
+                    <a:p>
+                      <a:r>
+                        <a:rPr lang="en-US" dirty="0"/>
+                        <a:t>Stack</a:t>
+                      </a:r>
+                    </a:p>
+                  </a:txBody>
+                  <a:tcPr/>
+                </a:tc>
+                <a:tc>
+                  <a:txBody>
+                    <a:bodyPr/>
+                    <a:lstStyle/>
+                    <a:p>
+                      <a:r>
+                        <a:rPr lang="en-US" dirty="0"/>
+                        <a:t>Heap</a:t>
+                      </a:r>
+                    </a:p>
+                  </a:txBody>
+                  <a:tcPr/>
+                </a:tc>
+                <a:extLst>
+                  <a:ext uri="{0D108BD9-81ED-4DB2-BD59-A6C34878D82A}">
+                    <a16:rowId xmlns:a16="http://schemas.microsoft.com/office/drawing/2014/main" val="878382068"/>
+                  </a:ext>
+                </a:extLst>
+              </a:tr>
+              <a:tr h="370840">
+                <a:tc>
+                  <a:txBody>
+                    <a:bodyPr/>
+                    <a:lstStyle/>
+                    <a:p>
+                      <a:endParaRPr lang="en-US" dirty="0"/>
+                    </a:p>
+                  </a:txBody>
+                  <a:tcPr/>
+                </a:tc>
+                <a:tc>
+                  <a:txBody>
+                    <a:bodyPr/>
+                    <a:lstStyle/>
+                    <a:p>
+                      <a:endParaRPr lang="en-US"/>
+                    </a:p>
+                  </a:txBody>
+                  <a:tcPr/>
+                </a:tc>
+                <a:extLst>
+                  <a:ext uri="{0D108BD9-81ED-4DB2-BD59-A6C34878D82A}">
+                    <a16:rowId xmlns:a16="http://schemas.microsoft.com/office/drawing/2014/main" val="1453275764"/>
+                  </a:ext>
+                </a:extLst>
+              </a:tr>
+              <a:tr h="370840">
+                <a:tc>
+                  <a:txBody>
+                    <a:bodyPr/>
+                    <a:lstStyle/>
+                    <a:p>
+                      <a:endParaRPr lang="en-US"/>
+                    </a:p>
+                  </a:txBody>
+                  <a:tcPr/>
+                </a:tc>
+                <a:tc>
+                  <a:txBody>
+                    <a:bodyPr/>
+                    <a:lstStyle/>
+                    <a:p>
+                      <a:endParaRPr lang="en-US"/>
+                    </a:p>
+                  </a:txBody>
+                  <a:tcPr/>
+                </a:tc>
+                <a:extLst>
+                  <a:ext uri="{0D108BD9-81ED-4DB2-BD59-A6C34878D82A}">
+                    <a16:rowId xmlns:a16="http://schemas.microsoft.com/office/drawing/2014/main" val="1085301058"/>
+                  </a:ext>
+                </a:extLst>
+              </a:tr>
+              <a:tr h="370840">
+                <a:tc>
+                  <a:txBody>
+                    <a:bodyPr/>
+                    <a:lstStyle/>
+                    <a:p>
+                      <a:endParaRPr lang="en-US"/>
+                    </a:p>
+                  </a:txBody>
+                  <a:tcPr/>
+                </a:tc>
+                <a:tc>
+                  <a:txBody>
+                    <a:bodyPr/>
+                    <a:lstStyle/>
+                    <a:p>
+                      <a:endParaRPr lang="en-US"/>
+                    </a:p>
+                  </a:txBody>
+                  <a:tcPr/>
+                </a:tc>
+                <a:extLst>
+                  <a:ext uri="{0D108BD9-81ED-4DB2-BD59-A6C34878D82A}">
+                    <a16:rowId xmlns:a16="http://schemas.microsoft.com/office/drawing/2014/main" val="1439697167"/>
+                  </a:ext>
+                </a:extLst>
+              </a:tr>
+              <a:tr h="370840">
+                <a:tc>
+                  <a:txBody>
+                    <a:bodyPr/>
+                    <a:lstStyle/>
+                    <a:p>
+                      <a:endParaRPr lang="en-US"/>
+                    </a:p>
+                  </a:txBody>
+                  <a:tcPr/>
+                </a:tc>
+                <a:tc>
+                  <a:txBody>
+                    <a:bodyPr/>
+                    <a:lstStyle/>
+                    <a:p>
+                      <a:endParaRPr lang="en-US"/>
+                    </a:p>
+                  </a:txBody>
+                  <a:tcPr/>
+                </a:tc>
+                <a:extLst>
+                  <a:ext uri="{0D108BD9-81ED-4DB2-BD59-A6C34878D82A}">
+                    <a16:rowId xmlns:a16="http://schemas.microsoft.com/office/drawing/2014/main" val="2339673359"/>
+                  </a:ext>
+                </a:extLst>
+              </a:tr>
+              <a:tr h="370840">
+                <a:tc>
+                  <a:txBody>
+                    <a:bodyPr/>
+                    <a:lstStyle/>
+                    <a:p>
+                      <a:endParaRPr lang="en-US"/>
+                    </a:p>
+                  </a:txBody>
+                  <a:tcPr/>
+                </a:tc>
+                <a:tc>
+                  <a:txBody>
+                    <a:bodyPr/>
+                    <a:lstStyle/>
+                    <a:p>
+                      <a:endParaRPr lang="en-US"/>
+                    </a:p>
+                  </a:txBody>
+                  <a:tcPr/>
+                </a:tc>
+                <a:extLst>
+                  <a:ext uri="{0D108BD9-81ED-4DB2-BD59-A6C34878D82A}">
+                    <a16:rowId xmlns:a16="http://schemas.microsoft.com/office/drawing/2014/main" val="1589749043"/>
+                  </a:ext>
+                </a:extLst>
+              </a:tr>
+              <a:tr h="370840">
+                <a:tc>
+                  <a:txBody>
+                    <a:bodyPr/>
+                    <a:lstStyle/>
+                    <a:p>
+                      <a:endParaRPr lang="en-US"/>
+                    </a:p>
+                  </a:txBody>
+                  <a:tcPr/>
+                </a:tc>
+                <a:tc>
+                  <a:txBody>
+                    <a:bodyPr/>
+                    <a:lstStyle/>
+                    <a:p>
+                      <a:endParaRPr lang="en-US"/>
+                    </a:p>
+                  </a:txBody>
+                  <a:tcPr/>
+                </a:tc>
+                <a:extLst>
+                  <a:ext uri="{0D108BD9-81ED-4DB2-BD59-A6C34878D82A}">
+                    <a16:rowId xmlns:a16="http://schemas.microsoft.com/office/drawing/2014/main" val="3631780859"/>
+                  </a:ext>
+                </a:extLst>
+              </a:tr>
+              <a:tr h="370840">
+                <a:tc>
+                  <a:txBody>
+                    <a:bodyPr/>
+                    <a:lstStyle/>
+                    <a:p>
+                      <a:r>
+                        <a:rPr lang="en-US" dirty="0"/>
+                        <a:t>Var </a:t>
+                      </a:r>
+                      <a:r>
+                        <a:rPr lang="en-US" dirty="0" err="1"/>
+                        <a:t>myObject</a:t>
+                      </a:r>
+                      <a:r>
+                        <a:rPr lang="en-US" dirty="0"/>
+                        <a:t> = 0xa25f1c </a:t>
+                      </a:r>
+                    </a:p>
+                  </a:txBody>
+                  <a:tcPr/>
+                </a:tc>
+                <a:tc>
+                  <a:txBody>
+                    <a:bodyPr/>
+                    <a:lstStyle/>
+                    <a:p>
+                      <a:endParaRPr lang="en-US" dirty="0"/>
+                    </a:p>
+                  </a:txBody>
+                  <a:tcPr/>
+                </a:tc>
+                <a:extLst>
+                  <a:ext uri="{0D108BD9-81ED-4DB2-BD59-A6C34878D82A}">
+                    <a16:rowId xmlns:a16="http://schemas.microsoft.com/office/drawing/2014/main" val="1939365945"/>
+                  </a:ext>
+                </a:extLst>
+              </a:tr>
+              <a:tr h="370840">
+                <a:tc>
+                  <a:txBody>
+                    <a:bodyPr/>
+                    <a:lstStyle/>
+                    <a:p>
+                      <a:r>
+                        <a:rPr lang="en-US" dirty="0"/>
+                        <a:t>Var </a:t>
+                      </a:r>
+                      <a:r>
+                        <a:rPr lang="en-US" dirty="0" err="1"/>
+                        <a:t>mybigint</a:t>
+                      </a:r>
+                      <a:r>
+                        <a:rPr lang="en-US" dirty="0"/>
+                        <a:t> = 16756549843219876219874321689</a:t>
+                      </a:r>
+                    </a:p>
+                  </a:txBody>
+                  <a:tcPr/>
+                </a:tc>
+                <a:tc>
+                  <a:txBody>
+                    <a:bodyPr/>
+                    <a:lstStyle/>
+                    <a:p>
+                      <a:endParaRPr lang="en-US" dirty="0"/>
+                    </a:p>
+                  </a:txBody>
+                  <a:tcPr/>
+                </a:tc>
+                <a:extLst>
+                  <a:ext uri="{0D108BD9-81ED-4DB2-BD59-A6C34878D82A}">
+                    <a16:rowId xmlns:a16="http://schemas.microsoft.com/office/drawing/2014/main" val="3558679854"/>
+                  </a:ext>
+                </a:extLst>
+              </a:tr>
+              <a:tr h="370840">
+                <a:tc>
+                  <a:txBody>
+                    <a:bodyPr/>
+                    <a:lstStyle/>
+                    <a:p>
+                      <a:r>
+                        <a:rPr lang="en-US" dirty="0"/>
+                        <a:t>Var </a:t>
+                      </a:r>
+                      <a:r>
+                        <a:rPr lang="en-US" dirty="0" err="1"/>
+                        <a:t>myint</a:t>
+                      </a:r>
+                      <a:r>
+                        <a:rPr lang="en-US" dirty="0"/>
+                        <a:t> = 2;</a:t>
+                      </a:r>
+                    </a:p>
+                  </a:txBody>
+                  <a:tcPr/>
+                </a:tc>
+                <a:tc>
+                  <a:txBody>
+                    <a:bodyPr/>
+                    <a:lstStyle/>
+                    <a:p>
+                      <a:r>
+                        <a:rPr lang="en-US" dirty="0"/>
+                        <a:t>0xa25f1c (customer{</a:t>
+                      </a:r>
+                      <a:r>
+                        <a:rPr lang="en-US" dirty="0" err="1"/>
+                        <a:t>name:’Mark</a:t>
+                      </a:r>
+                      <a:r>
+                        <a:rPr lang="en-US" dirty="0"/>
+                        <a:t>”, age”42})</a:t>
+                      </a:r>
+                    </a:p>
+                  </a:txBody>
+                  <a:tcPr/>
+                </a:tc>
+                <a:extLst>
+                  <a:ext uri="{0D108BD9-81ED-4DB2-BD59-A6C34878D82A}">
+                    <a16:rowId xmlns:a16="http://schemas.microsoft.com/office/drawing/2014/main" val="1482569140"/>
+                  </a:ext>
+                </a:extLst>
+              </a:tr>
+            </a:tbl>
+          </a:graphicData>
+        </a:graphic>
+      </p:graphicFrame>
+      <mc:AlternateContent xmlns:mc="http://schemas.openxmlformats.org/markup-compatibility/2006">
+        <mc:Choice xmlns:p14="http://schemas.microsoft.com/office/powerpoint/2010/main" Requires="p14">
+          <p:contentPart p14:bwMode="auto" r:id="rId2">
+            <p14:nvContentPartPr>
+              <p14:cNvPr id="5" name="Ink 4">
+                <a:extLst>
+                  <a:ext uri="{FF2B5EF4-FFF2-40B4-BE49-F238E27FC236}">
+                    <a16:creationId xmlns:a16="http://schemas.microsoft.com/office/drawing/2014/main" id="{2AA0B8F3-76FB-4E1F-81F8-C3E8EC944159}"/>
+                  </a:ext>
+                </a:extLst>
+              </p14:cNvPr>
+              <p14:cNvContentPartPr/>
+              <p14:nvPr/>
+            </p14:nvContentPartPr>
+            <p14:xfrm>
+              <a:off x="3305062" y="4585770"/>
+              <a:ext cx="100800" cy="10080"/>
+            </p14:xfrm>
+          </p:contentPart>
+        </mc:Choice>
+        <mc:Fallback>
+          <p:pic>
+            <p:nvPicPr>
+              <p:cNvPr id="5" name="Ink 4">
+                <a:extLst>
+                  <a:ext uri="{FF2B5EF4-FFF2-40B4-BE49-F238E27FC236}">
+                    <a16:creationId xmlns:a16="http://schemas.microsoft.com/office/drawing/2014/main" id="{2AA0B8F3-76FB-4E1F-81F8-C3E8EC944159}"/>
+                  </a:ext>
+                </a:extLst>
+              </p:cNvPr>
+              <p:cNvPicPr/>
+              <p:nvPr/>
+            </p:nvPicPr>
+            <p:blipFill>
+              <a:blip r:embed="rId3"/>
+              <a:stretch>
+                <a:fillRect/>
+              </a:stretch>
+            </p:blipFill>
+            <p:spPr>
+              <a:xfrm>
+                <a:off x="3296062" y="4576770"/>
+                <a:ext cx="118440" cy="27720"/>
+              </a:xfrm>
+              <a:prstGeom prst="rect">
+                <a:avLst/>
+              </a:prstGeom>
+            </p:spPr>
+          </p:pic>
+        </mc:Fallback>
+      </mc:AlternateContent>
+      <mc:AlternateContent xmlns:mc="http://schemas.openxmlformats.org/markup-compatibility/2006">
+        <mc:Choice xmlns:p14="http://schemas.microsoft.com/office/powerpoint/2010/main" Requires="p14">
+          <p:contentPart p14:bwMode="auto" r:id="rId4">
+            <p14:nvContentPartPr>
+              <p14:cNvPr id="9" name="Ink 8">
+                <a:extLst>
+                  <a:ext uri="{FF2B5EF4-FFF2-40B4-BE49-F238E27FC236}">
+                    <a16:creationId xmlns:a16="http://schemas.microsoft.com/office/drawing/2014/main" id="{01EAD357-B7C3-445C-B59D-BEC01F5B0440}"/>
+                  </a:ext>
+                </a:extLst>
+              </p14:cNvPr>
+              <p14:cNvContentPartPr/>
+              <p14:nvPr/>
+            </p14:nvContentPartPr>
+            <p14:xfrm>
+              <a:off x="2361862" y="5104890"/>
+              <a:ext cx="3234600" cy="43560"/>
+            </p14:xfrm>
+          </p:contentPart>
+        </mc:Choice>
+        <mc:Fallback>
+          <p:pic>
+            <p:nvPicPr>
+              <p:cNvPr id="9" name="Ink 8">
+                <a:extLst>
+                  <a:ext uri="{FF2B5EF4-FFF2-40B4-BE49-F238E27FC236}">
+                    <a16:creationId xmlns:a16="http://schemas.microsoft.com/office/drawing/2014/main" id="{01EAD357-B7C3-445C-B59D-BEC01F5B0440}"/>
+                  </a:ext>
+                </a:extLst>
+              </p:cNvPr>
+              <p:cNvPicPr/>
+              <p:nvPr/>
+            </p:nvPicPr>
+            <p:blipFill>
+              <a:blip r:embed="rId5"/>
+              <a:stretch>
+                <a:fillRect/>
+              </a:stretch>
+            </p:blipFill>
+            <p:spPr>
+              <a:xfrm>
+                <a:off x="2352862" y="5096250"/>
+                <a:ext cx="3252240" cy="61200"/>
+              </a:xfrm>
+              <a:prstGeom prst="rect">
+                <a:avLst/>
+              </a:prstGeom>
+            </p:spPr>
+          </p:pic>
+        </mc:Fallback>
+      </mc:AlternateContent>
+      <mc:AlternateContent xmlns:mc="http://schemas.openxmlformats.org/markup-compatibility/2006">
+        <mc:Choice xmlns:p14="http://schemas.microsoft.com/office/powerpoint/2010/main" Requires="p14">
+          <p:contentPart p14:bwMode="auto" r:id="rId6">
+            <p14:nvContentPartPr>
+              <p14:cNvPr id="11" name="Ink 10">
+                <a:extLst>
+                  <a:ext uri="{FF2B5EF4-FFF2-40B4-BE49-F238E27FC236}">
+                    <a16:creationId xmlns:a16="http://schemas.microsoft.com/office/drawing/2014/main" id="{874ACB16-95DC-40D1-B89D-1E2FDB63A67A}"/>
+                  </a:ext>
+                </a:extLst>
+              </p14:cNvPr>
+              <p14:cNvContentPartPr/>
+              <p14:nvPr/>
+            </p14:nvContentPartPr>
+            <p14:xfrm>
+              <a:off x="1919062" y="5404770"/>
+              <a:ext cx="282240" cy="14760"/>
+            </p14:xfrm>
+          </p:contentPart>
+        </mc:Choice>
+        <mc:Fallback>
+          <p:pic>
+            <p:nvPicPr>
+              <p:cNvPr id="11" name="Ink 10">
+                <a:extLst>
+                  <a:ext uri="{FF2B5EF4-FFF2-40B4-BE49-F238E27FC236}">
+                    <a16:creationId xmlns:a16="http://schemas.microsoft.com/office/drawing/2014/main" id="{874ACB16-95DC-40D1-B89D-1E2FDB63A67A}"/>
+                  </a:ext>
+                </a:extLst>
+              </p:cNvPr>
+              <p:cNvPicPr/>
+              <p:nvPr/>
+            </p:nvPicPr>
+            <p:blipFill>
+              <a:blip r:embed="rId7"/>
+              <a:stretch>
+                <a:fillRect/>
+              </a:stretch>
+            </p:blipFill>
+            <p:spPr>
+              <a:xfrm>
+                <a:off x="1910062" y="5396130"/>
+                <a:ext cx="299880" cy="32400"/>
+              </a:xfrm>
+              <a:prstGeom prst="rect">
+                <a:avLst/>
+              </a:prstGeom>
+            </p:spPr>
+          </p:pic>
+        </mc:Fallback>
+      </mc:AlternateContent>
+      <p:grpSp>
+        <p:nvGrpSpPr>
+          <p:cNvPr id="16" name="Group 15">
+            <a:extLst>
+              <a:ext uri="{FF2B5EF4-FFF2-40B4-BE49-F238E27FC236}">
+                <a16:creationId xmlns:a16="http://schemas.microsoft.com/office/drawing/2014/main" id="{DA82A726-3CB4-4957-9E9A-7BAE7733C58A}"/>
+              </a:ext>
+            </a:extLst>
+          </p:cNvPr>
+          <p:cNvGrpSpPr/>
+          <p:nvPr/>
+        </p:nvGrpSpPr>
+        <p:grpSpPr>
+          <a:xfrm>
+            <a:off x="3395422" y="4590450"/>
+            <a:ext cx="6741360" cy="1077480"/>
+            <a:chOff x="3395422" y="4590450"/>
+            <a:chExt cx="6741360" cy="1077480"/>
+          </a:xfrm>
+        </p:grpSpPr>
+        <mc:AlternateContent xmlns:mc="http://schemas.openxmlformats.org/markup-compatibility/2006">
+          <mc:Choice xmlns:p14="http://schemas.microsoft.com/office/powerpoint/2010/main" Requires="p14">
+            <p:contentPart p14:bwMode="auto" r:id="rId8">
+              <p14:nvContentPartPr>
+                <p14:cNvPr id="6" name="Ink 5">
+                  <a:extLst>
+                    <a:ext uri="{FF2B5EF4-FFF2-40B4-BE49-F238E27FC236}">
+                      <a16:creationId xmlns:a16="http://schemas.microsoft.com/office/drawing/2014/main" id="{B399CE81-0955-4EAD-8B41-D8BEF1F88E24}"/>
+                    </a:ext>
+                  </a:extLst>
+                </p14:cNvPr>
+                <p14:cNvContentPartPr/>
+                <p14:nvPr/>
+              </p14:nvContentPartPr>
+              <p14:xfrm>
+                <a:off x="3395422" y="4590450"/>
+                <a:ext cx="2775600" cy="759240"/>
+              </p14:xfrm>
+            </p:contentPart>
+          </mc:Choice>
+          <mc:Fallback>
+            <p:pic>
+              <p:nvPicPr>
+                <p:cNvPr id="6" name="Ink 5">
+                  <a:extLst>
+                    <a:ext uri="{FF2B5EF4-FFF2-40B4-BE49-F238E27FC236}">
+                      <a16:creationId xmlns:a16="http://schemas.microsoft.com/office/drawing/2014/main" id="{B399CE81-0955-4EAD-8B41-D8BEF1F88E24}"/>
+                    </a:ext>
+                  </a:extLst>
+                </p:cNvPr>
+                <p:cNvPicPr/>
+                <p:nvPr/>
+              </p:nvPicPr>
+              <p:blipFill>
+                <a:blip r:embed="rId9"/>
+                <a:stretch>
+                  <a:fillRect/>
+                </a:stretch>
+              </p:blipFill>
+              <p:spPr>
+                <a:xfrm>
+                  <a:off x="3386782" y="4581810"/>
+                  <a:ext cx="2793240" cy="776880"/>
+                </a:xfrm>
+                <a:prstGeom prst="rect">
+                  <a:avLst/>
+                </a:prstGeom>
+              </p:spPr>
+            </p:pic>
+          </mc:Fallback>
+        </mc:AlternateContent>
+        <mc:AlternateContent xmlns:mc="http://schemas.openxmlformats.org/markup-compatibility/2006">
+          <mc:Choice xmlns:p14="http://schemas.microsoft.com/office/powerpoint/2010/main" Requires="p14">
+            <p:contentPart p14:bwMode="auto" r:id="rId10">
+              <p14:nvContentPartPr>
+                <p14:cNvPr id="7" name="Ink 6">
+                  <a:extLst>
+                    <a:ext uri="{FF2B5EF4-FFF2-40B4-BE49-F238E27FC236}">
+                      <a16:creationId xmlns:a16="http://schemas.microsoft.com/office/drawing/2014/main" id="{C5211CDB-4961-4383-93E9-EF1F2F5B65A7}"/>
+                    </a:ext>
+                  </a:extLst>
+                </p14:cNvPr>
+                <p14:cNvContentPartPr/>
+                <p14:nvPr/>
+              </p14:nvContentPartPr>
+              <p14:xfrm>
+                <a:off x="6050062" y="5261850"/>
+                <a:ext cx="104760" cy="188280"/>
+              </p14:xfrm>
+            </p:contentPart>
+          </mc:Choice>
+          <mc:Fallback>
+            <p:pic>
+              <p:nvPicPr>
+                <p:cNvPr id="7" name="Ink 6">
+                  <a:extLst>
+                    <a:ext uri="{FF2B5EF4-FFF2-40B4-BE49-F238E27FC236}">
+                      <a16:creationId xmlns:a16="http://schemas.microsoft.com/office/drawing/2014/main" id="{C5211CDB-4961-4383-93E9-EF1F2F5B65A7}"/>
+                    </a:ext>
+                  </a:extLst>
+                </p:cNvPr>
+                <p:cNvPicPr/>
+                <p:nvPr/>
+              </p:nvPicPr>
+              <p:blipFill>
+                <a:blip r:embed="rId11"/>
+                <a:stretch>
+                  <a:fillRect/>
+                </a:stretch>
+              </p:blipFill>
+              <p:spPr>
+                <a:xfrm>
+                  <a:off x="6041062" y="5253210"/>
+                  <a:ext cx="122400" cy="205920"/>
+                </a:xfrm>
+                <a:prstGeom prst="rect">
+                  <a:avLst/>
+                </a:prstGeom>
+              </p:spPr>
+            </p:pic>
+          </mc:Fallback>
+        </mc:AlternateContent>
+        <mc:AlternateContent xmlns:mc="http://schemas.openxmlformats.org/markup-compatibility/2006">
+          <mc:Choice xmlns:p14="http://schemas.microsoft.com/office/powerpoint/2010/main" Requires="p14">
+            <p:contentPart p14:bwMode="auto" r:id="rId12">
+              <p14:nvContentPartPr>
+                <p14:cNvPr id="12" name="Ink 11">
+                  <a:extLst>
+                    <a:ext uri="{FF2B5EF4-FFF2-40B4-BE49-F238E27FC236}">
+                      <a16:creationId xmlns:a16="http://schemas.microsoft.com/office/drawing/2014/main" id="{5761C714-B030-4FD1-8ADF-A1AA75686AD2}"/>
+                    </a:ext>
+                  </a:extLst>
+                </p14:cNvPr>
+                <p14:cNvContentPartPr/>
+                <p14:nvPr/>
+              </p14:nvContentPartPr>
+              <p14:xfrm>
+                <a:off x="7086502" y="5475690"/>
+                <a:ext cx="3050280" cy="58680"/>
+              </p14:xfrm>
+            </p:contentPart>
+          </mc:Choice>
+          <mc:Fallback>
+            <p:pic>
+              <p:nvPicPr>
+                <p:cNvPr id="12" name="Ink 11">
+                  <a:extLst>
+                    <a:ext uri="{FF2B5EF4-FFF2-40B4-BE49-F238E27FC236}">
+                      <a16:creationId xmlns:a16="http://schemas.microsoft.com/office/drawing/2014/main" id="{5761C714-B030-4FD1-8ADF-A1AA75686AD2}"/>
+                    </a:ext>
+                  </a:extLst>
+                </p:cNvPr>
+                <p:cNvPicPr/>
+                <p:nvPr/>
+              </p:nvPicPr>
+              <p:blipFill>
+                <a:blip r:embed="rId13"/>
+                <a:stretch>
+                  <a:fillRect/>
+                </a:stretch>
+              </p:blipFill>
+              <p:spPr>
+                <a:xfrm>
+                  <a:off x="7077502" y="5466690"/>
+                  <a:ext cx="3067920" cy="76320"/>
+                </a:xfrm>
+                <a:prstGeom prst="rect">
+                  <a:avLst/>
+                </a:prstGeom>
+              </p:spPr>
+            </p:pic>
+          </mc:Fallback>
+        </mc:AlternateContent>
+        <mc:AlternateContent xmlns:mc="http://schemas.openxmlformats.org/markup-compatibility/2006">
+          <mc:Choice xmlns:p14="http://schemas.microsoft.com/office/powerpoint/2010/main" Requires="p14">
+            <p:contentPart p14:bwMode="auto" r:id="rId14">
+              <p14:nvContentPartPr>
+                <p14:cNvPr id="13" name="Ink 12">
+                  <a:extLst>
+                    <a:ext uri="{FF2B5EF4-FFF2-40B4-BE49-F238E27FC236}">
+                      <a16:creationId xmlns:a16="http://schemas.microsoft.com/office/drawing/2014/main" id="{25BE2E3D-FAF5-4A76-91CE-4B40C98755FB}"/>
+                    </a:ext>
+                  </a:extLst>
+                </p14:cNvPr>
+                <p14:cNvContentPartPr/>
+                <p14:nvPr/>
+              </p14:nvContentPartPr>
+              <p14:xfrm>
+                <a:off x="6238702" y="5428890"/>
+                <a:ext cx="597240" cy="34200"/>
+              </p14:xfrm>
+            </p:contentPart>
+          </mc:Choice>
+          <mc:Fallback>
+            <p:pic>
+              <p:nvPicPr>
+                <p:cNvPr id="13" name="Ink 12">
+                  <a:extLst>
+                    <a:ext uri="{FF2B5EF4-FFF2-40B4-BE49-F238E27FC236}">
+                      <a16:creationId xmlns:a16="http://schemas.microsoft.com/office/drawing/2014/main" id="{25BE2E3D-FAF5-4A76-91CE-4B40C98755FB}"/>
+                    </a:ext>
+                  </a:extLst>
+                </p:cNvPr>
+                <p:cNvPicPr/>
+                <p:nvPr/>
+              </p:nvPicPr>
+              <p:blipFill>
+                <a:blip r:embed="rId15"/>
+                <a:stretch>
+                  <a:fillRect/>
+                </a:stretch>
+              </p:blipFill>
+              <p:spPr>
+                <a:xfrm>
+                  <a:off x="6229702" y="5420250"/>
+                  <a:ext cx="614880" cy="51840"/>
+                </a:xfrm>
+                <a:prstGeom prst="rect">
+                  <a:avLst/>
+                </a:prstGeom>
+              </p:spPr>
+            </p:pic>
+          </mc:Fallback>
+        </mc:AlternateContent>
+        <mc:AlternateContent xmlns:mc="http://schemas.openxmlformats.org/markup-compatibility/2006">
+          <mc:Choice xmlns:p14="http://schemas.microsoft.com/office/powerpoint/2010/main" Requires="p14">
+            <p:contentPart p14:bwMode="auto" r:id="rId16">
+              <p14:nvContentPartPr>
+                <p14:cNvPr id="14" name="Ink 13">
+                  <a:extLst>
+                    <a:ext uri="{FF2B5EF4-FFF2-40B4-BE49-F238E27FC236}">
+                      <a16:creationId xmlns:a16="http://schemas.microsoft.com/office/drawing/2014/main" id="{A154AE10-13E9-4667-BD9E-67B14A8C1BE6}"/>
+                    </a:ext>
+                  </a:extLst>
+                </p14:cNvPr>
+                <p14:cNvContentPartPr/>
+                <p14:nvPr/>
+              </p14:nvContentPartPr>
+              <p14:xfrm>
+                <a:off x="6257422" y="5509530"/>
+                <a:ext cx="589320" cy="19800"/>
+              </p14:xfrm>
+            </p:contentPart>
+          </mc:Choice>
+          <mc:Fallback>
+            <p:pic>
+              <p:nvPicPr>
+                <p:cNvPr id="14" name="Ink 13">
+                  <a:extLst>
+                    <a:ext uri="{FF2B5EF4-FFF2-40B4-BE49-F238E27FC236}">
+                      <a16:creationId xmlns:a16="http://schemas.microsoft.com/office/drawing/2014/main" id="{A154AE10-13E9-4667-BD9E-67B14A8C1BE6}"/>
+                    </a:ext>
+                  </a:extLst>
+                </p:cNvPr>
+                <p:cNvPicPr/>
+                <p:nvPr/>
+              </p:nvPicPr>
+              <p:blipFill>
+                <a:blip r:embed="rId17"/>
+                <a:stretch>
+                  <a:fillRect/>
+                </a:stretch>
+              </p:blipFill>
+              <p:spPr>
+                <a:xfrm>
+                  <a:off x="6248782" y="5500530"/>
+                  <a:ext cx="606960" cy="37440"/>
+                </a:xfrm>
+                <a:prstGeom prst="rect">
+                  <a:avLst/>
+                </a:prstGeom>
+              </p:spPr>
+            </p:pic>
+          </mc:Fallback>
+        </mc:AlternateContent>
+        <mc:AlternateContent xmlns:mc="http://schemas.openxmlformats.org/markup-compatibility/2006">
+          <mc:Choice xmlns:p14="http://schemas.microsoft.com/office/powerpoint/2010/main" Requires="p14">
+            <p:contentPart p14:bwMode="auto" r:id="rId18">
+              <p14:nvContentPartPr>
+                <p14:cNvPr id="15" name="Ink 14">
+                  <a:extLst>
+                    <a:ext uri="{FF2B5EF4-FFF2-40B4-BE49-F238E27FC236}">
+                      <a16:creationId xmlns:a16="http://schemas.microsoft.com/office/drawing/2014/main" id="{42D9D009-063C-4C3C-B19C-6F5C19AD2EAD}"/>
+                    </a:ext>
+                  </a:extLst>
+                </p14:cNvPr>
+                <p14:cNvContentPartPr/>
+                <p14:nvPr/>
+              </p14:nvContentPartPr>
+              <p14:xfrm>
+                <a:off x="6224302" y="5628330"/>
+                <a:ext cx="603000" cy="39600"/>
+              </p14:xfrm>
+            </p:contentPart>
+          </mc:Choice>
+          <mc:Fallback>
+            <p:pic>
+              <p:nvPicPr>
+                <p:cNvPr id="15" name="Ink 14">
+                  <a:extLst>
+                    <a:ext uri="{FF2B5EF4-FFF2-40B4-BE49-F238E27FC236}">
+                      <a16:creationId xmlns:a16="http://schemas.microsoft.com/office/drawing/2014/main" id="{42D9D009-063C-4C3C-B19C-6F5C19AD2EAD}"/>
+                    </a:ext>
+                  </a:extLst>
+                </p:cNvPr>
+                <p:cNvPicPr/>
+                <p:nvPr/>
+              </p:nvPicPr>
+              <p:blipFill>
+                <a:blip r:embed="rId19"/>
+                <a:stretch>
+                  <a:fillRect/>
+                </a:stretch>
+              </p:blipFill>
+              <p:spPr>
+                <a:xfrm>
+                  <a:off x="6215302" y="5619690"/>
+                  <a:ext cx="620640" cy="57240"/>
+                </a:xfrm>
+                <a:prstGeom prst="rect">
+                  <a:avLst/>
+                </a:prstGeom>
+              </p:spPr>
+            </p:pic>
+          </mc:Fallback>
+        </mc:AlternateContent>
+      </p:grpSp>
+      <mc:AlternateContent xmlns:mc="http://schemas.openxmlformats.org/markup-compatibility/2006">
+        <mc:Choice xmlns:p14="http://schemas.microsoft.com/office/powerpoint/2010/main" Requires="p14">
+          <p:contentPart p14:bwMode="auto" r:id="rId20">
+            <p14:nvContentPartPr>
+              <p14:cNvPr id="17" name="Ink 16">
+                <a:extLst>
+                  <a:ext uri="{FF2B5EF4-FFF2-40B4-BE49-F238E27FC236}">
+                    <a16:creationId xmlns:a16="http://schemas.microsoft.com/office/drawing/2014/main" id="{2F84152C-25DB-488B-85A1-F3C3BFD7D873}"/>
+                  </a:ext>
+                </a:extLst>
+              </p14:cNvPr>
+              <p14:cNvContentPartPr/>
+              <p14:nvPr/>
+            </p14:nvContentPartPr>
+            <p14:xfrm>
+              <a:off x="2394982" y="4723650"/>
+              <a:ext cx="862560" cy="18720"/>
+            </p14:xfrm>
+          </p:contentPart>
+        </mc:Choice>
+        <mc:Fallback>
+          <p:pic>
+            <p:nvPicPr>
+              <p:cNvPr id="17" name="Ink 16">
+                <a:extLst>
+                  <a:ext uri="{FF2B5EF4-FFF2-40B4-BE49-F238E27FC236}">
+                    <a16:creationId xmlns:a16="http://schemas.microsoft.com/office/drawing/2014/main" id="{2F84152C-25DB-488B-85A1-F3C3BFD7D873}"/>
+                  </a:ext>
+                </a:extLst>
+              </p:cNvPr>
+              <p:cNvPicPr/>
+              <p:nvPr/>
+            </p:nvPicPr>
+            <p:blipFill>
+              <a:blip r:embed="rId21"/>
+              <a:stretch>
+                <a:fillRect/>
+              </a:stretch>
+            </p:blipFill>
+            <p:spPr>
+              <a:xfrm>
+                <a:off x="2386342" y="4715010"/>
+                <a:ext cx="880200" cy="36360"/>
+              </a:xfrm>
+              <a:prstGeom prst="rect">
+                <a:avLst/>
+              </a:prstGeom>
+            </p:spPr>
+          </p:pic>
+        </mc:Fallback>
+      </mc:AlternateContent>
+      <mc:AlternateContent xmlns:mc="http://schemas.openxmlformats.org/markup-compatibility/2006">
+        <mc:Choice xmlns:p14="http://schemas.microsoft.com/office/powerpoint/2010/main" Requires="p14">
+          <p:contentPart p14:bwMode="auto" r:id="rId22">
+            <p14:nvContentPartPr>
+              <p14:cNvPr id="18" name="Ink 17">
+                <a:extLst>
+                  <a:ext uri="{FF2B5EF4-FFF2-40B4-BE49-F238E27FC236}">
+                    <a16:creationId xmlns:a16="http://schemas.microsoft.com/office/drawing/2014/main" id="{490BEB94-BC43-4D66-96B9-489D044A8E82}"/>
+                  </a:ext>
+                </a:extLst>
+              </p14:cNvPr>
+              <p14:cNvContentPartPr/>
+              <p14:nvPr/>
+            </p14:nvContentPartPr>
+            <p14:xfrm>
+              <a:off x="333262" y="5433570"/>
+              <a:ext cx="360" cy="360"/>
+            </p14:xfrm>
+          </p:contentPart>
+        </mc:Choice>
+        <mc:Fallback>
+          <p:pic>
+            <p:nvPicPr>
+              <p:cNvPr id="18" name="Ink 17">
+                <a:extLst>
+                  <a:ext uri="{FF2B5EF4-FFF2-40B4-BE49-F238E27FC236}">
+                    <a16:creationId xmlns:a16="http://schemas.microsoft.com/office/drawing/2014/main" id="{490BEB94-BC43-4D66-96B9-489D044A8E82}"/>
+                  </a:ext>
+                </a:extLst>
+              </p:cNvPr>
+              <p:cNvPicPr/>
+              <p:nvPr/>
+            </p:nvPicPr>
+            <p:blipFill>
+              <a:blip r:embed="rId23"/>
+              <a:stretch>
+                <a:fillRect/>
+              </a:stretch>
+            </p:blipFill>
+            <p:spPr>
+              <a:xfrm>
+                <a:off x="324262" y="5424570"/>
+                <a:ext cx="18000" cy="18000"/>
+              </a:xfrm>
+              <a:prstGeom prst="rect">
+                <a:avLst/>
+              </a:prstGeom>
+            </p:spPr>
+          </p:pic>
+        </mc:Fallback>
+      </mc:AlternateContent>
+    </p:spTree>
+    <p:extLst>
+      <p:ext uri="{BB962C8B-B14F-4D97-AF65-F5344CB8AC3E}">
+        <p14:creationId xmlns:p14="http://schemas.microsoft.com/office/powerpoint/2010/main" val="4223186376"/>
+      </p:ext>
+    </p:extLst>
+  </p:cSld>
+  <p:clrMapOvr>
+    <a:masterClrMapping/>
+  </p:clrMapOvr>
+</p:sld>
+</file>
+
 <file path=ppt/theme/theme1.xml><?xml version="1.0" encoding="utf-8"?>
 <a:theme xmlns:a="http://schemas.openxmlformats.org/drawingml/2006/main" name="Office Theme">
   <a:themeElements>

</xml_diff>

<commit_message>
adds rewiring of console store app to includ erepo pattern
</commit_message>
<xml_diff>
--- a/pdfs/ClassNotesAndDescriptions.pptx
+++ b/pdfs/ClassNotesAndDescriptions.pptx
@@ -9,6 +9,7 @@
     <p:sldId id="259" r:id="rId3"/>
     <p:sldId id="260" r:id="rId4"/>
     <p:sldId id="261" r:id="rId5"/>
+    <p:sldId id="262" r:id="rId6"/>
   </p:sldIdLst>
   <p:sldSz cx="12192000" cy="6858000"/>
   <p:notesSz cx="6858000" cy="9144000"/>
@@ -3721,6 +3722,481 @@
 </p:sld>
 </file>
 
+<file path=ppt/slides/slide5.xml><?xml version="1.0" encoding="utf-8"?>
+<p:sld xmlns:a="http://schemas.openxmlformats.org/drawingml/2006/main" xmlns:r="http://schemas.openxmlformats.org/officeDocument/2006/relationships" xmlns:p="http://schemas.openxmlformats.org/presentationml/2006/main">
+  <p:cSld>
+    <p:spTree>
+      <p:nvGrpSpPr>
+        <p:cNvPr id="1" name=""/>
+        <p:cNvGrpSpPr/>
+        <p:nvPr/>
+      </p:nvGrpSpPr>
+      <p:grpSpPr>
+        <a:xfrm>
+          <a:off x="0" y="0"/>
+          <a:ext cx="0" cy="0"/>
+          <a:chOff x="0" y="0"/>
+          <a:chExt cx="0" cy="0"/>
+        </a:xfrm>
+      </p:grpSpPr>
+      <p:sp>
+        <p:nvSpPr>
+          <p:cNvPr id="2" name="Title 1">
+            <a:extLst>
+              <a:ext uri="{FF2B5EF4-FFF2-40B4-BE49-F238E27FC236}">
+                <a16:creationId xmlns:a16="http://schemas.microsoft.com/office/drawing/2014/main" id="{FC917AC9-F0BC-456D-BE87-C731F644363A}"/>
+              </a:ext>
+            </a:extLst>
+          </p:cNvPr>
+          <p:cNvSpPr>
+            <a:spLocks noGrp="1"/>
+          </p:cNvSpPr>
+          <p:nvPr>
+            <p:ph type="title"/>
+          </p:nvPr>
+        </p:nvSpPr>
+        <p:spPr/>
+        <p:txBody>
+          <a:bodyPr/>
+          <a:lstStyle/>
+          <a:p>
+            <a:r>
+              <a:rPr lang="en-US" dirty="0"/>
+              <a:t>Store app structure</a:t>
+            </a:r>
+          </a:p>
+        </p:txBody>
+      </p:sp>
+      <p:sp>
+        <p:nvSpPr>
+          <p:cNvPr id="4" name="Oval 3">
+            <a:extLst>
+              <a:ext uri="{FF2B5EF4-FFF2-40B4-BE49-F238E27FC236}">
+                <a16:creationId xmlns:a16="http://schemas.microsoft.com/office/drawing/2014/main" id="{EB57B862-8062-4499-B103-2A1BD73696BC}"/>
+              </a:ext>
+            </a:extLst>
+          </p:cNvPr>
+          <p:cNvSpPr/>
+          <p:nvPr/>
+        </p:nvSpPr>
+        <p:spPr>
+          <a:xfrm>
+            <a:off x="1627095" y="5481077"/>
+            <a:ext cx="3299012" cy="1201269"/>
+          </a:xfrm>
+          <a:prstGeom prst="ellipse">
+            <a:avLst/>
+          </a:prstGeom>
+        </p:spPr>
+        <p:style>
+          <a:lnRef idx="2">
+            <a:schemeClr val="accent1">
+              <a:shade val="50000"/>
+            </a:schemeClr>
+          </a:lnRef>
+          <a:fillRef idx="1">
+            <a:schemeClr val="accent1"/>
+          </a:fillRef>
+          <a:effectRef idx="0">
+            <a:schemeClr val="accent1"/>
+          </a:effectRef>
+          <a:fontRef idx="minor">
+            <a:schemeClr val="lt1"/>
+          </a:fontRef>
+        </p:style>
+        <p:txBody>
+          <a:bodyPr rtlCol="0" anchor="ctr"/>
+          <a:lstStyle/>
+          <a:p>
+            <a:pPr algn="ctr"/>
+            <a:r>
+              <a:rPr lang="en-US" dirty="0"/>
+              <a:t>Context Layer</a:t>
+            </a:r>
+          </a:p>
+          <a:p>
+            <a:pPr algn="ctr"/>
+            <a:r>
+              <a:rPr lang="en-US" dirty="0"/>
+              <a:t>Repository Layer</a:t>
+            </a:r>
+          </a:p>
+        </p:txBody>
+      </p:sp>
+      <p:sp>
+        <p:nvSpPr>
+          <p:cNvPr id="5" name="Oval 4">
+            <a:extLst>
+              <a:ext uri="{FF2B5EF4-FFF2-40B4-BE49-F238E27FC236}">
+                <a16:creationId xmlns:a16="http://schemas.microsoft.com/office/drawing/2014/main" id="{AA0FF1EF-B0FE-4222-BAEB-CC414990F128}"/>
+              </a:ext>
+            </a:extLst>
+          </p:cNvPr>
+          <p:cNvSpPr/>
+          <p:nvPr/>
+        </p:nvSpPr>
+        <p:spPr>
+          <a:xfrm>
+            <a:off x="7265895" y="3162298"/>
+            <a:ext cx="3299012" cy="1568823"/>
+          </a:xfrm>
+          <a:prstGeom prst="ellipse">
+            <a:avLst/>
+          </a:prstGeom>
+        </p:spPr>
+        <p:style>
+          <a:lnRef idx="2">
+            <a:schemeClr val="accent1">
+              <a:shade val="50000"/>
+            </a:schemeClr>
+          </a:lnRef>
+          <a:fillRef idx="1">
+            <a:schemeClr val="accent1"/>
+          </a:fillRef>
+          <a:effectRef idx="0">
+            <a:schemeClr val="accent1"/>
+          </a:effectRef>
+          <a:fontRef idx="minor">
+            <a:schemeClr val="lt1"/>
+          </a:fontRef>
+        </p:style>
+        <p:txBody>
+          <a:bodyPr rtlCol="0" anchor="ctr"/>
+          <a:lstStyle/>
+          <a:p>
+            <a:pPr algn="ctr"/>
+            <a:r>
+              <a:rPr lang="en-US" dirty="0"/>
+              <a:t>Models Layer</a:t>
+            </a:r>
+          </a:p>
+        </p:txBody>
+      </p:sp>
+      <p:sp>
+        <p:nvSpPr>
+          <p:cNvPr id="6" name="Oval 5">
+            <a:extLst>
+              <a:ext uri="{FF2B5EF4-FFF2-40B4-BE49-F238E27FC236}">
+                <a16:creationId xmlns:a16="http://schemas.microsoft.com/office/drawing/2014/main" id="{591C51C9-84F5-4F65-902D-0039349A3488}"/>
+              </a:ext>
+            </a:extLst>
+          </p:cNvPr>
+          <p:cNvSpPr/>
+          <p:nvPr/>
+        </p:nvSpPr>
+        <p:spPr>
+          <a:xfrm>
+            <a:off x="1676400" y="3538817"/>
+            <a:ext cx="3299012" cy="1257301"/>
+          </a:xfrm>
+          <a:prstGeom prst="ellipse">
+            <a:avLst/>
+          </a:prstGeom>
+        </p:spPr>
+        <p:style>
+          <a:lnRef idx="2">
+            <a:schemeClr val="accent1">
+              <a:shade val="50000"/>
+            </a:schemeClr>
+          </a:lnRef>
+          <a:fillRef idx="1">
+            <a:schemeClr val="accent1"/>
+          </a:fillRef>
+          <a:effectRef idx="0">
+            <a:schemeClr val="accent1"/>
+          </a:effectRef>
+          <a:fontRef idx="minor">
+            <a:schemeClr val="lt1"/>
+          </a:fontRef>
+        </p:style>
+        <p:txBody>
+          <a:bodyPr rtlCol="0" anchor="ctr"/>
+          <a:lstStyle/>
+          <a:p>
+            <a:pPr algn="ctr"/>
+            <a:r>
+              <a:rPr lang="en-US" dirty="0"/>
+              <a:t>Business Layer</a:t>
+            </a:r>
+          </a:p>
+        </p:txBody>
+      </p:sp>
+      <p:sp>
+        <p:nvSpPr>
+          <p:cNvPr id="7" name="Oval 6">
+            <a:extLst>
+              <a:ext uri="{FF2B5EF4-FFF2-40B4-BE49-F238E27FC236}">
+                <a16:creationId xmlns:a16="http://schemas.microsoft.com/office/drawing/2014/main" id="{BE981694-16B8-47A0-BE6A-1F5980298A85}"/>
+              </a:ext>
+            </a:extLst>
+          </p:cNvPr>
+          <p:cNvSpPr/>
+          <p:nvPr/>
+        </p:nvSpPr>
+        <p:spPr>
+          <a:xfrm>
+            <a:off x="1676400" y="1457607"/>
+            <a:ext cx="3299012" cy="1325564"/>
+          </a:xfrm>
+          <a:prstGeom prst="ellipse">
+            <a:avLst/>
+          </a:prstGeom>
+        </p:spPr>
+        <p:style>
+          <a:lnRef idx="2">
+            <a:schemeClr val="accent1">
+              <a:shade val="50000"/>
+            </a:schemeClr>
+          </a:lnRef>
+          <a:fillRef idx="1">
+            <a:schemeClr val="accent1"/>
+          </a:fillRef>
+          <a:effectRef idx="0">
+            <a:schemeClr val="accent1"/>
+          </a:effectRef>
+          <a:fontRef idx="minor">
+            <a:schemeClr val="lt1"/>
+          </a:fontRef>
+        </p:style>
+        <p:txBody>
+          <a:bodyPr rtlCol="0" anchor="ctr"/>
+          <a:lstStyle/>
+          <a:p>
+            <a:pPr algn="ctr"/>
+            <a:r>
+              <a:rPr lang="en-US" dirty="0"/>
+              <a:t>UI Layer</a:t>
+            </a:r>
+          </a:p>
+        </p:txBody>
+      </p:sp>
+      <p:cxnSp>
+        <p:nvCxnSpPr>
+          <p:cNvPr id="9" name="Straight Arrow Connector 8">
+            <a:extLst>
+              <a:ext uri="{FF2B5EF4-FFF2-40B4-BE49-F238E27FC236}">
+                <a16:creationId xmlns:a16="http://schemas.microsoft.com/office/drawing/2014/main" id="{F0BAC3EE-8DDA-482B-B10F-6729CCFAA0AB}"/>
+              </a:ext>
+            </a:extLst>
+          </p:cNvPr>
+          <p:cNvCxnSpPr>
+            <a:stCxn id="7" idx="4"/>
+            <a:endCxn id="6" idx="0"/>
+          </p:cNvCxnSpPr>
+          <p:nvPr/>
+        </p:nvCxnSpPr>
+        <p:spPr>
+          <a:xfrm>
+            <a:off x="3325906" y="2783171"/>
+            <a:ext cx="0" cy="755646"/>
+          </a:xfrm>
+          <a:prstGeom prst="straightConnector1">
+            <a:avLst/>
+          </a:prstGeom>
+          <a:ln w="28575">
+            <a:tailEnd type="triangle"/>
+          </a:ln>
+        </p:spPr>
+        <p:style>
+          <a:lnRef idx="1">
+            <a:schemeClr val="accent1"/>
+          </a:lnRef>
+          <a:fillRef idx="0">
+            <a:schemeClr val="accent1"/>
+          </a:fillRef>
+          <a:effectRef idx="0">
+            <a:schemeClr val="accent1"/>
+          </a:effectRef>
+          <a:fontRef idx="minor">
+            <a:schemeClr val="tx1"/>
+          </a:fontRef>
+        </p:style>
+      </p:cxnSp>
+      <p:cxnSp>
+        <p:nvCxnSpPr>
+          <p:cNvPr id="10" name="Straight Arrow Connector 9">
+            <a:extLst>
+              <a:ext uri="{FF2B5EF4-FFF2-40B4-BE49-F238E27FC236}">
+                <a16:creationId xmlns:a16="http://schemas.microsoft.com/office/drawing/2014/main" id="{AF09D32E-AA6A-41E8-9D46-A9C79AC29F90}"/>
+              </a:ext>
+            </a:extLst>
+          </p:cNvPr>
+          <p:cNvCxnSpPr>
+            <a:cxnSpLocks/>
+            <a:stCxn id="6" idx="4"/>
+            <a:endCxn id="4" idx="0"/>
+          </p:cNvCxnSpPr>
+          <p:nvPr/>
+        </p:nvCxnSpPr>
+        <p:spPr>
+          <a:xfrm flipH="1">
+            <a:off x="3276601" y="4796118"/>
+            <a:ext cx="49305" cy="684959"/>
+          </a:xfrm>
+          <a:prstGeom prst="straightConnector1">
+            <a:avLst/>
+          </a:prstGeom>
+          <a:ln w="28575">
+            <a:tailEnd type="triangle"/>
+          </a:ln>
+        </p:spPr>
+        <p:style>
+          <a:lnRef idx="1">
+            <a:schemeClr val="accent1"/>
+          </a:lnRef>
+          <a:fillRef idx="0">
+            <a:schemeClr val="accent1"/>
+          </a:fillRef>
+          <a:effectRef idx="0">
+            <a:schemeClr val="accent1"/>
+          </a:effectRef>
+          <a:fontRef idx="minor">
+            <a:schemeClr val="tx1"/>
+          </a:fontRef>
+        </p:style>
+      </p:cxnSp>
+      <p:cxnSp>
+        <p:nvCxnSpPr>
+          <p:cNvPr id="13" name="Straight Arrow Connector 12">
+            <a:extLst>
+              <a:ext uri="{FF2B5EF4-FFF2-40B4-BE49-F238E27FC236}">
+                <a16:creationId xmlns:a16="http://schemas.microsoft.com/office/drawing/2014/main" id="{16E1DD89-1176-43CA-8453-69C99C2D67DD}"/>
+              </a:ext>
+            </a:extLst>
+          </p:cNvPr>
+          <p:cNvCxnSpPr>
+            <a:cxnSpLocks/>
+            <a:stCxn id="7" idx="6"/>
+            <a:endCxn id="5" idx="2"/>
+          </p:cNvCxnSpPr>
+          <p:nvPr/>
+        </p:nvCxnSpPr>
+        <p:spPr>
+          <a:xfrm>
+            <a:off x="4975412" y="2120389"/>
+            <a:ext cx="2290483" cy="1826321"/>
+          </a:xfrm>
+          <a:prstGeom prst="straightConnector1">
+            <a:avLst/>
+          </a:prstGeom>
+          <a:ln w="28575">
+            <a:tailEnd type="triangle"/>
+          </a:ln>
+        </p:spPr>
+        <p:style>
+          <a:lnRef idx="1">
+            <a:schemeClr val="accent1"/>
+          </a:lnRef>
+          <a:fillRef idx="0">
+            <a:schemeClr val="accent1"/>
+          </a:fillRef>
+          <a:effectRef idx="0">
+            <a:schemeClr val="accent1"/>
+          </a:effectRef>
+          <a:fontRef idx="minor">
+            <a:schemeClr val="tx1"/>
+          </a:fontRef>
+        </p:style>
+      </p:cxnSp>
+      <p:cxnSp>
+        <p:nvCxnSpPr>
+          <p:cNvPr id="16" name="Straight Arrow Connector 15">
+            <a:extLst>
+              <a:ext uri="{FF2B5EF4-FFF2-40B4-BE49-F238E27FC236}">
+                <a16:creationId xmlns:a16="http://schemas.microsoft.com/office/drawing/2014/main" id="{2E8D71BA-5F50-4C58-B6AC-A5A4B9B4019E}"/>
+              </a:ext>
+            </a:extLst>
+          </p:cNvPr>
+          <p:cNvCxnSpPr>
+            <a:cxnSpLocks/>
+            <a:stCxn id="6" idx="6"/>
+            <a:endCxn id="5" idx="2"/>
+          </p:cNvCxnSpPr>
+          <p:nvPr/>
+        </p:nvCxnSpPr>
+        <p:spPr>
+          <a:xfrm flipV="1">
+            <a:off x="4975412" y="3946710"/>
+            <a:ext cx="2290483" cy="220758"/>
+          </a:xfrm>
+          <a:prstGeom prst="straightConnector1">
+            <a:avLst/>
+          </a:prstGeom>
+          <a:ln w="28575">
+            <a:tailEnd type="triangle"/>
+          </a:ln>
+        </p:spPr>
+        <p:style>
+          <a:lnRef idx="1">
+            <a:schemeClr val="accent1"/>
+          </a:lnRef>
+          <a:fillRef idx="0">
+            <a:schemeClr val="accent1"/>
+          </a:fillRef>
+          <a:effectRef idx="0">
+            <a:schemeClr val="accent1"/>
+          </a:effectRef>
+          <a:fontRef idx="minor">
+            <a:schemeClr val="tx1"/>
+          </a:fontRef>
+        </p:style>
+      </p:cxnSp>
+      <p:cxnSp>
+        <p:nvCxnSpPr>
+          <p:cNvPr id="18" name="Straight Arrow Connector 17">
+            <a:extLst>
+              <a:ext uri="{FF2B5EF4-FFF2-40B4-BE49-F238E27FC236}">
+                <a16:creationId xmlns:a16="http://schemas.microsoft.com/office/drawing/2014/main" id="{F99CBD90-0711-43AE-BE46-1A414EDCC617}"/>
+              </a:ext>
+            </a:extLst>
+          </p:cNvPr>
+          <p:cNvCxnSpPr>
+            <a:cxnSpLocks/>
+            <a:stCxn id="4" idx="6"/>
+            <a:endCxn id="5" idx="2"/>
+          </p:cNvCxnSpPr>
+          <p:nvPr/>
+        </p:nvCxnSpPr>
+        <p:spPr>
+          <a:xfrm flipV="1">
+            <a:off x="4926107" y="3946710"/>
+            <a:ext cx="2339788" cy="2135002"/>
+          </a:xfrm>
+          <a:prstGeom prst="straightConnector1">
+            <a:avLst/>
+          </a:prstGeom>
+          <a:ln w="28575">
+            <a:tailEnd type="triangle"/>
+          </a:ln>
+        </p:spPr>
+        <p:style>
+          <a:lnRef idx="1">
+            <a:schemeClr val="accent1"/>
+          </a:lnRef>
+          <a:fillRef idx="0">
+            <a:schemeClr val="accent1"/>
+          </a:fillRef>
+          <a:effectRef idx="0">
+            <a:schemeClr val="accent1"/>
+          </a:effectRef>
+          <a:fontRef idx="minor">
+            <a:schemeClr val="tx1"/>
+          </a:fontRef>
+        </p:style>
+      </p:cxnSp>
+    </p:spTree>
+    <p:extLst>
+      <p:ext uri="{BB962C8B-B14F-4D97-AF65-F5344CB8AC3E}">
+        <p14:creationId xmlns:p14="http://schemas.microsoft.com/office/powerpoint/2010/main" val="2382664368"/>
+      </p:ext>
+    </p:extLst>
+  </p:cSld>
+  <p:clrMapOvr>
+    <a:masterClrMapping/>
+  </p:clrMapOvr>
+</p:sld>
+</file>
+
 <file path=ppt/theme/theme1.xml><?xml version="1.0" encoding="utf-8"?>
 <a:theme xmlns:a="http://schemas.openxmlformats.org/drawingml/2006/main" name="Office Theme">
   <a:themeElements>

</xml_diff>